<commit_message>
Changed small mistake (pluto -> goofy)
</commit_message>
<xml_diff>
--- a/Dokumentation/Workshop_Folien.pptx
+++ b/Dokumentation/Workshop_Folien.pptx
@@ -6245,7 +6245,7 @@
           <a:p>
             <a:fld id="{B644A486-56E9-43FB-9486-7A01D1FD06EF}" type="datetimeFigureOut">
               <a:rPr lang="de-DE" smtClean="0"/>
-              <a:t>10.07.2023</a:t>
+              <a:t>18.07.2023</a:t>
             </a:fld>
             <a:endParaRPr lang="de-DE"/>
           </a:p>
@@ -12476,6 +12476,331 @@
           </a:extLst>
         </p:spPr>
       </p:pic>
+      <p:sp>
+        <p:nvSpPr>
+          <p:cNvPr id="3" name="Textfeld 2">
+            <a:extLst>
+              <a:ext uri="{FF2B5EF4-FFF2-40B4-BE49-F238E27FC236}">
+                <a16:creationId xmlns:a16="http://schemas.microsoft.com/office/drawing/2014/main" id="{98F3086F-E322-271E-2858-7B994D951D33}"/>
+              </a:ext>
+            </a:extLst>
+          </p:cNvPr>
+          <p:cNvSpPr txBox="1"/>
+          <p:nvPr/>
+        </p:nvSpPr>
+        <p:spPr>
+          <a:xfrm>
+            <a:off x="1990153" y="4644709"/>
+            <a:ext cx="2042097" cy="338554"/>
+          </a:xfrm>
+          <a:prstGeom prst="rect">
+            <a:avLst/>
+          </a:prstGeom>
+          <a:solidFill>
+            <a:schemeClr val="bg1"/>
+          </a:solidFill>
+        </p:spPr>
+        <p:txBody>
+          <a:bodyPr wrap="none" rtlCol="0">
+            <a:spAutoFit/>
+          </a:bodyPr>
+          <a:lstStyle/>
+          <a:p>
+            <a:r>
+              <a:rPr lang="de-DE" sz="1600" b="1" dirty="0">
+                <a:solidFill>
+                  <a:srgbClr val="6D9EEB"/>
+                </a:solidFill>
+              </a:rPr>
+              <a:t>Daisy</a:t>
+            </a:r>
+            <a:r>
+              <a:rPr lang="de-DE" sz="1600" b="1" dirty="0"/>
+              <a:t>     </a:t>
+            </a:r>
+            <a:r>
+              <a:rPr lang="de-DE" sz="1600" b="1" dirty="0">
+                <a:solidFill>
+                  <a:srgbClr val="FE9900"/>
+                </a:solidFill>
+              </a:rPr>
+              <a:t>Goofy</a:t>
+            </a:r>
+            <a:r>
+              <a:rPr lang="de-DE" sz="1600" b="1" dirty="0"/>
+              <a:t>   </a:t>
+            </a:r>
+            <a:r>
+              <a:rPr lang="de-DE" sz="1600" b="1" dirty="0">
+                <a:solidFill>
+                  <a:srgbClr val="FF0002"/>
+                </a:solidFill>
+              </a:rPr>
+              <a:t>Micky</a:t>
+            </a:r>
+          </a:p>
+        </p:txBody>
+      </p:sp>
+      <p:sp>
+        <p:nvSpPr>
+          <p:cNvPr id="6" name="Textfeld 5">
+            <a:extLst>
+              <a:ext uri="{FF2B5EF4-FFF2-40B4-BE49-F238E27FC236}">
+                <a16:creationId xmlns:a16="http://schemas.microsoft.com/office/drawing/2014/main" id="{0C698237-BDDC-6B5D-CAF5-984A2902C298}"/>
+              </a:ext>
+            </a:extLst>
+          </p:cNvPr>
+          <p:cNvSpPr txBox="1"/>
+          <p:nvPr/>
+        </p:nvSpPr>
+        <p:spPr>
+          <a:xfrm>
+            <a:off x="4984792" y="4644709"/>
+            <a:ext cx="2042097" cy="338554"/>
+          </a:xfrm>
+          <a:prstGeom prst="rect">
+            <a:avLst/>
+          </a:prstGeom>
+          <a:solidFill>
+            <a:schemeClr val="bg1"/>
+          </a:solidFill>
+        </p:spPr>
+        <p:txBody>
+          <a:bodyPr wrap="none" rtlCol="0">
+            <a:spAutoFit/>
+          </a:bodyPr>
+          <a:lstStyle/>
+          <a:p>
+            <a:r>
+              <a:rPr lang="de-DE" sz="1600" b="1" dirty="0">
+                <a:solidFill>
+                  <a:srgbClr val="6D9EEB"/>
+                </a:solidFill>
+              </a:rPr>
+              <a:t>Daisy</a:t>
+            </a:r>
+            <a:r>
+              <a:rPr lang="de-DE" sz="1600" b="1" dirty="0"/>
+              <a:t>     </a:t>
+            </a:r>
+            <a:r>
+              <a:rPr lang="de-DE" sz="1600" b="1" dirty="0">
+                <a:solidFill>
+                  <a:srgbClr val="FE9900"/>
+                </a:solidFill>
+              </a:rPr>
+              <a:t>Goofy</a:t>
+            </a:r>
+            <a:r>
+              <a:rPr lang="de-DE" sz="1600" b="1" dirty="0"/>
+              <a:t>   </a:t>
+            </a:r>
+            <a:r>
+              <a:rPr lang="de-DE" sz="1600" b="1" dirty="0">
+                <a:solidFill>
+                  <a:srgbClr val="FF0002"/>
+                </a:solidFill>
+              </a:rPr>
+              <a:t>Micky</a:t>
+            </a:r>
+          </a:p>
+        </p:txBody>
+      </p:sp>
+      <p:sp>
+        <p:nvSpPr>
+          <p:cNvPr id="7" name="Textfeld 6">
+            <a:extLst>
+              <a:ext uri="{FF2B5EF4-FFF2-40B4-BE49-F238E27FC236}">
+                <a16:creationId xmlns:a16="http://schemas.microsoft.com/office/drawing/2014/main" id="{A4C7D121-8BB3-60AA-109B-6D6299FE51E6}"/>
+              </a:ext>
+            </a:extLst>
+          </p:cNvPr>
+          <p:cNvSpPr txBox="1"/>
+          <p:nvPr/>
+        </p:nvSpPr>
+        <p:spPr>
+          <a:xfrm>
+            <a:off x="8079803" y="4644709"/>
+            <a:ext cx="2042097" cy="338554"/>
+          </a:xfrm>
+          <a:prstGeom prst="rect">
+            <a:avLst/>
+          </a:prstGeom>
+          <a:solidFill>
+            <a:schemeClr val="bg1"/>
+          </a:solidFill>
+        </p:spPr>
+        <p:txBody>
+          <a:bodyPr wrap="none" rtlCol="0">
+            <a:spAutoFit/>
+          </a:bodyPr>
+          <a:lstStyle/>
+          <a:p>
+            <a:r>
+              <a:rPr lang="de-DE" sz="1600" b="1" dirty="0">
+                <a:solidFill>
+                  <a:srgbClr val="6D9EEB"/>
+                </a:solidFill>
+              </a:rPr>
+              <a:t>Daisy</a:t>
+            </a:r>
+            <a:r>
+              <a:rPr lang="de-DE" sz="1600" b="1" dirty="0"/>
+              <a:t>     </a:t>
+            </a:r>
+            <a:r>
+              <a:rPr lang="de-DE" sz="1600" b="1" dirty="0">
+                <a:solidFill>
+                  <a:srgbClr val="FE9900"/>
+                </a:solidFill>
+              </a:rPr>
+              <a:t>Goofy</a:t>
+            </a:r>
+            <a:r>
+              <a:rPr lang="de-DE" sz="1600" b="1" dirty="0"/>
+              <a:t>   </a:t>
+            </a:r>
+            <a:r>
+              <a:rPr lang="de-DE" sz="1600" b="1" dirty="0">
+                <a:solidFill>
+                  <a:srgbClr val="FF0002"/>
+                </a:solidFill>
+              </a:rPr>
+              <a:t>Micky</a:t>
+            </a:r>
+          </a:p>
+        </p:txBody>
+      </p:sp>
+      <p:sp>
+        <p:nvSpPr>
+          <p:cNvPr id="8" name="Textfeld 7">
+            <a:extLst>
+              <a:ext uri="{FF2B5EF4-FFF2-40B4-BE49-F238E27FC236}">
+                <a16:creationId xmlns:a16="http://schemas.microsoft.com/office/drawing/2014/main" id="{B117AD2A-ACFE-AF3C-9BE8-9254D6CB9879}"/>
+              </a:ext>
+            </a:extLst>
+          </p:cNvPr>
+          <p:cNvSpPr txBox="1"/>
+          <p:nvPr/>
+        </p:nvSpPr>
+        <p:spPr>
+          <a:xfrm>
+            <a:off x="1996503" y="4644709"/>
+            <a:ext cx="2042097" cy="338554"/>
+          </a:xfrm>
+          <a:prstGeom prst="rect">
+            <a:avLst/>
+          </a:prstGeom>
+          <a:solidFill>
+            <a:schemeClr val="bg1"/>
+          </a:solidFill>
+        </p:spPr>
+        <p:txBody>
+          <a:bodyPr wrap="none" rtlCol="0">
+            <a:spAutoFit/>
+          </a:bodyPr>
+          <a:lstStyle/>
+          <a:p>
+            <a:r>
+              <a:rPr lang="de-DE" sz="1600" b="1" dirty="0">
+                <a:solidFill>
+                  <a:srgbClr val="6D9EEB"/>
+                </a:solidFill>
+              </a:rPr>
+              <a:t>Daisy</a:t>
+            </a:r>
+            <a:r>
+              <a:rPr lang="de-DE" sz="1600" b="1" dirty="0"/>
+              <a:t>     </a:t>
+            </a:r>
+            <a:r>
+              <a:rPr lang="de-DE" sz="1600" b="1" dirty="0">
+                <a:solidFill>
+                  <a:srgbClr val="FE9900"/>
+                </a:solidFill>
+              </a:rPr>
+              <a:t>Goofy</a:t>
+            </a:r>
+            <a:r>
+              <a:rPr lang="de-DE" sz="1600" b="1" dirty="0"/>
+              <a:t>   </a:t>
+            </a:r>
+            <a:r>
+              <a:rPr lang="de-DE" sz="1600" b="1" dirty="0">
+                <a:solidFill>
+                  <a:srgbClr val="FF0002"/>
+                </a:solidFill>
+              </a:rPr>
+              <a:t>Micky</a:t>
+            </a:r>
+          </a:p>
+        </p:txBody>
+      </p:sp>
+      <p:sp>
+        <p:nvSpPr>
+          <p:cNvPr id="9" name="Textfeld 8">
+            <a:extLst>
+              <a:ext uri="{FF2B5EF4-FFF2-40B4-BE49-F238E27FC236}">
+                <a16:creationId xmlns:a16="http://schemas.microsoft.com/office/drawing/2014/main" id="{75D77779-26E3-8C2C-DB7B-C962C97509B9}"/>
+              </a:ext>
+            </a:extLst>
+          </p:cNvPr>
+          <p:cNvSpPr txBox="1"/>
+          <p:nvPr/>
+        </p:nvSpPr>
+        <p:spPr>
+          <a:xfrm>
+            <a:off x="8086153" y="4644709"/>
+            <a:ext cx="2042097" cy="338554"/>
+          </a:xfrm>
+          <a:prstGeom prst="rect">
+            <a:avLst/>
+          </a:prstGeom>
+          <a:solidFill>
+            <a:schemeClr val="bg1"/>
+          </a:solidFill>
+        </p:spPr>
+        <p:txBody>
+          <a:bodyPr wrap="none" rtlCol="0">
+            <a:spAutoFit/>
+          </a:bodyPr>
+          <a:lstStyle/>
+          <a:p>
+            <a:r>
+              <a:rPr lang="de-DE" sz="1600" b="1" dirty="0">
+                <a:solidFill>
+                  <a:srgbClr val="6D9EEB"/>
+                </a:solidFill>
+              </a:rPr>
+              <a:t>Daisy</a:t>
+            </a:r>
+            <a:r>
+              <a:rPr lang="de-DE" sz="1600" b="1" dirty="0"/>
+              <a:t>     </a:t>
+            </a:r>
+            <a:r>
+              <a:rPr lang="de-DE" sz="1600" b="1" dirty="0">
+                <a:solidFill>
+                  <a:srgbClr val="FE9900"/>
+                </a:solidFill>
+              </a:rPr>
+              <a:t>Goofy</a:t>
+            </a:r>
+            <a:r>
+              <a:rPr lang="de-DE" sz="1600" b="1" dirty="0"/>
+              <a:t>   </a:t>
+            </a:r>
+            <a:r>
+              <a:rPr lang="de-DE" sz="1600" b="1" dirty="0">
+                <a:solidFill>
+                  <a:srgbClr val="FF0002"/>
+                </a:solidFill>
+              </a:rPr>
+              <a:t>Micky</a:t>
+            </a:r>
+          </a:p>
+        </p:txBody>
+      </p:sp>
     </p:spTree>
     <p:extLst>
       <p:ext uri="{BB962C8B-B14F-4D97-AF65-F5344CB8AC3E}">
@@ -12706,6 +13031,201 @@
           </a:prstGeom>
         </p:spPr>
       </p:pic>
+      <p:sp>
+        <p:nvSpPr>
+          <p:cNvPr id="3" name="Textfeld 2">
+            <a:extLst>
+              <a:ext uri="{FF2B5EF4-FFF2-40B4-BE49-F238E27FC236}">
+                <a16:creationId xmlns:a16="http://schemas.microsoft.com/office/drawing/2014/main" id="{BE297F89-BA0B-771B-C67E-4E1CB51B376F}"/>
+              </a:ext>
+            </a:extLst>
+          </p:cNvPr>
+          <p:cNvSpPr txBox="1"/>
+          <p:nvPr/>
+        </p:nvSpPr>
+        <p:spPr>
+          <a:xfrm>
+            <a:off x="5010192" y="4644709"/>
+            <a:ext cx="2042097" cy="338554"/>
+          </a:xfrm>
+          <a:prstGeom prst="rect">
+            <a:avLst/>
+          </a:prstGeom>
+          <a:solidFill>
+            <a:schemeClr val="bg1"/>
+          </a:solidFill>
+        </p:spPr>
+        <p:txBody>
+          <a:bodyPr wrap="none" rtlCol="0">
+            <a:spAutoFit/>
+          </a:bodyPr>
+          <a:lstStyle/>
+          <a:p>
+            <a:r>
+              <a:rPr lang="de-DE" sz="1600" b="1" dirty="0">
+                <a:solidFill>
+                  <a:srgbClr val="6D9EEB"/>
+                </a:solidFill>
+              </a:rPr>
+              <a:t>Daisy</a:t>
+            </a:r>
+            <a:r>
+              <a:rPr lang="de-DE" sz="1600" b="1" dirty="0"/>
+              <a:t>     </a:t>
+            </a:r>
+            <a:r>
+              <a:rPr lang="de-DE" sz="1600" b="1" dirty="0">
+                <a:solidFill>
+                  <a:srgbClr val="FE9900"/>
+                </a:solidFill>
+              </a:rPr>
+              <a:t>Goofy</a:t>
+            </a:r>
+            <a:r>
+              <a:rPr lang="de-DE" sz="1600" b="1" dirty="0"/>
+              <a:t>   </a:t>
+            </a:r>
+            <a:r>
+              <a:rPr lang="de-DE" sz="1600" b="1" dirty="0">
+                <a:solidFill>
+                  <a:srgbClr val="FF0002"/>
+                </a:solidFill>
+              </a:rPr>
+              <a:t>Micky</a:t>
+            </a:r>
+          </a:p>
+        </p:txBody>
+      </p:sp>
+      <p:sp>
+        <p:nvSpPr>
+          <p:cNvPr id="6" name="Textfeld 5">
+            <a:extLst>
+              <a:ext uri="{FF2B5EF4-FFF2-40B4-BE49-F238E27FC236}">
+                <a16:creationId xmlns:a16="http://schemas.microsoft.com/office/drawing/2014/main" id="{C5CB4EA5-C715-76D5-41F4-A127F1A94FD9}"/>
+              </a:ext>
+            </a:extLst>
+          </p:cNvPr>
+          <p:cNvSpPr txBox="1"/>
+          <p:nvPr/>
+        </p:nvSpPr>
+        <p:spPr>
+          <a:xfrm>
+            <a:off x="2021903" y="4644709"/>
+            <a:ext cx="2042097" cy="338554"/>
+          </a:xfrm>
+          <a:prstGeom prst="rect">
+            <a:avLst/>
+          </a:prstGeom>
+          <a:solidFill>
+            <a:schemeClr val="bg1"/>
+          </a:solidFill>
+        </p:spPr>
+        <p:txBody>
+          <a:bodyPr wrap="none" rtlCol="0">
+            <a:spAutoFit/>
+          </a:bodyPr>
+          <a:lstStyle/>
+          <a:p>
+            <a:r>
+              <a:rPr lang="de-DE" sz="1600" b="1" dirty="0">
+                <a:solidFill>
+                  <a:srgbClr val="6D9EEB"/>
+                </a:solidFill>
+              </a:rPr>
+              <a:t>Daisy</a:t>
+            </a:r>
+            <a:r>
+              <a:rPr lang="de-DE" sz="1600" b="1" dirty="0"/>
+              <a:t>     </a:t>
+            </a:r>
+            <a:r>
+              <a:rPr lang="de-DE" sz="1600" b="1" dirty="0">
+                <a:solidFill>
+                  <a:srgbClr val="FE9900"/>
+                </a:solidFill>
+              </a:rPr>
+              <a:t>Goofy</a:t>
+            </a:r>
+            <a:r>
+              <a:rPr lang="de-DE" sz="1600" b="1" dirty="0"/>
+              <a:t>   </a:t>
+            </a:r>
+            <a:r>
+              <a:rPr lang="de-DE" sz="1600" b="1" dirty="0">
+                <a:solidFill>
+                  <a:srgbClr val="FF0002"/>
+                </a:solidFill>
+              </a:rPr>
+              <a:t>Micky</a:t>
+            </a:r>
+          </a:p>
+        </p:txBody>
+      </p:sp>
+      <p:sp>
+        <p:nvSpPr>
+          <p:cNvPr id="7" name="Textfeld 6">
+            <a:extLst>
+              <a:ext uri="{FF2B5EF4-FFF2-40B4-BE49-F238E27FC236}">
+                <a16:creationId xmlns:a16="http://schemas.microsoft.com/office/drawing/2014/main" id="{C2859AE1-437B-F574-20F8-8C1A8A5BD9F1}"/>
+              </a:ext>
+            </a:extLst>
+          </p:cNvPr>
+          <p:cNvSpPr txBox="1"/>
+          <p:nvPr/>
+        </p:nvSpPr>
+        <p:spPr>
+          <a:xfrm>
+            <a:off x="7997253" y="4644709"/>
+            <a:ext cx="2042097" cy="338554"/>
+          </a:xfrm>
+          <a:prstGeom prst="rect">
+            <a:avLst/>
+          </a:prstGeom>
+          <a:solidFill>
+            <a:schemeClr val="bg1"/>
+          </a:solidFill>
+        </p:spPr>
+        <p:txBody>
+          <a:bodyPr wrap="none" rtlCol="0">
+            <a:spAutoFit/>
+          </a:bodyPr>
+          <a:lstStyle/>
+          <a:p>
+            <a:r>
+              <a:rPr lang="de-DE" sz="1600" b="1" dirty="0">
+                <a:solidFill>
+                  <a:srgbClr val="6D9EEB"/>
+                </a:solidFill>
+              </a:rPr>
+              <a:t>Daisy</a:t>
+            </a:r>
+            <a:r>
+              <a:rPr lang="de-DE" sz="1600" b="1" dirty="0"/>
+              <a:t>     </a:t>
+            </a:r>
+            <a:r>
+              <a:rPr lang="de-DE" sz="1600" b="1" dirty="0">
+                <a:solidFill>
+                  <a:srgbClr val="FE9900"/>
+                </a:solidFill>
+              </a:rPr>
+              <a:t>Goofy</a:t>
+            </a:r>
+            <a:r>
+              <a:rPr lang="de-DE" sz="1600" b="1" dirty="0"/>
+              <a:t>   </a:t>
+            </a:r>
+            <a:r>
+              <a:rPr lang="de-DE" sz="1600" b="1" dirty="0">
+                <a:solidFill>
+                  <a:srgbClr val="FF0002"/>
+                </a:solidFill>
+              </a:rPr>
+              <a:t>Micky</a:t>
+            </a:r>
+          </a:p>
+        </p:txBody>
+      </p:sp>
     </p:spTree>
     <p:extLst>
       <p:ext uri="{BB962C8B-B14F-4D97-AF65-F5344CB8AC3E}">

</xml_diff>